<commit_message>
made changes based on sonar qube
</commit_message>
<xml_diff>
--- a/Office Leave Management System.pptx
+++ b/Office Leave Management System.pptx
@@ -12,7 +12,11 @@
     <p:sldId id="260" r:id="rId6"/>
     <p:sldId id="261" r:id="rId7"/>
     <p:sldId id="262" r:id="rId8"/>
-    <p:sldId id="263" r:id="rId9"/>
+    <p:sldId id="264" r:id="rId9"/>
+    <p:sldId id="265" r:id="rId10"/>
+    <p:sldId id="266" r:id="rId11"/>
+    <p:sldId id="267" r:id="rId12"/>
+    <p:sldId id="263" r:id="rId13"/>
   </p:sldIdLst>
   <p:sldSz cx="12192000" cy="6858000"/>
   <p:notesSz cx="6858000" cy="9144000"/>
@@ -111,6 +115,11 @@
       </a:defRPr>
     </a:lvl9pPr>
   </p:defaultTextStyle>
+  <p:extLst>
+    <p:ext uri="{EFAFB233-063F-42B5-8137-9DF3F51BA10A}">
+      <p15:sldGuideLst xmlns:p15="http://schemas.microsoft.com/office/powerpoint/2012/main"/>
+    </p:ext>
+  </p:extLst>
 </p:presentation>
 </file>
 
@@ -6172,6 +6181,293 @@
 </p:sld>
 </file>
 
+<file path=ppt/slides/slide10.xml><?xml version="1.0" encoding="utf-8"?>
+<p:sld xmlns:a="http://schemas.openxmlformats.org/drawingml/2006/main" xmlns:r="http://schemas.openxmlformats.org/officeDocument/2006/relationships" xmlns:p="http://schemas.openxmlformats.org/presentationml/2006/main">
+  <p:cSld>
+    <p:spTree>
+      <p:nvGrpSpPr>
+        <p:cNvPr id="1" name=""/>
+        <p:cNvGrpSpPr/>
+        <p:nvPr/>
+      </p:nvGrpSpPr>
+      <p:grpSpPr>
+        <a:xfrm>
+          <a:off x="0" y="0"/>
+          <a:ext cx="0" cy="0"/>
+          <a:chOff x="0" y="0"/>
+          <a:chExt cx="0" cy="0"/>
+        </a:xfrm>
+      </p:grpSpPr>
+      <p:sp>
+        <p:nvSpPr>
+          <p:cNvPr id="2" name="Title 1">
+            <a:extLst>
+              <a:ext uri="{FF2B5EF4-FFF2-40B4-BE49-F238E27FC236}">
+                <a16:creationId xmlns:a16="http://schemas.microsoft.com/office/drawing/2014/main" id="{7630272A-0627-5529-88F0-17F1ADBD4728}"/>
+              </a:ext>
+            </a:extLst>
+          </p:cNvPr>
+          <p:cNvSpPr>
+            <a:spLocks noGrp="1"/>
+          </p:cNvSpPr>
+          <p:nvPr>
+            <p:ph type="title"/>
+          </p:nvPr>
+        </p:nvSpPr>
+        <p:spPr/>
+        <p:txBody>
+          <a:bodyPr/>
+          <a:lstStyle/>
+          <a:p>
+            <a:r>
+              <a:rPr lang="en-US" dirty="0"/>
+              <a:t>Leave History Report</a:t>
+            </a:r>
+            <a:endParaRPr lang="en-IN" dirty="0"/>
+          </a:p>
+        </p:txBody>
+      </p:sp>
+      <p:pic>
+        <p:nvPicPr>
+          <p:cNvPr id="5" name="Content Placeholder 4">
+            <a:extLst>
+              <a:ext uri="{FF2B5EF4-FFF2-40B4-BE49-F238E27FC236}">
+                <a16:creationId xmlns:a16="http://schemas.microsoft.com/office/drawing/2014/main" id="{DEA1C4EA-0AB4-4D7B-C50A-8D15BFC26FAB}"/>
+              </a:ext>
+            </a:extLst>
+          </p:cNvPr>
+          <p:cNvPicPr>
+            <a:picLocks noGrp="1" noChangeAspect="1"/>
+          </p:cNvPicPr>
+          <p:nvPr>
+            <p:ph idx="1"/>
+          </p:nvPr>
+        </p:nvPicPr>
+        <p:blipFill>
+          <a:blip r:embed="rId2">
+            <a:extLst>
+              <a:ext uri="{28A0092B-C50C-407E-A947-70E740481C1C}">
+                <a14:useLocalDpi xmlns:a14="http://schemas.microsoft.com/office/drawing/2010/main" val="0"/>
+              </a:ext>
+            </a:extLst>
+          </a:blip>
+          <a:stretch>
+            <a:fillRect/>
+          </a:stretch>
+        </p:blipFill>
+        <p:spPr>
+          <a:xfrm>
+            <a:off x="745562" y="1347788"/>
+            <a:ext cx="9305272" cy="5373144"/>
+          </a:xfrm>
+        </p:spPr>
+      </p:pic>
+    </p:spTree>
+    <p:extLst>
+      <p:ext uri="{BB962C8B-B14F-4D97-AF65-F5344CB8AC3E}">
+        <p14:creationId xmlns:p14="http://schemas.microsoft.com/office/powerpoint/2010/main" val="1354062731"/>
+      </p:ext>
+    </p:extLst>
+  </p:cSld>
+  <p:clrMapOvr>
+    <a:masterClrMapping/>
+  </p:clrMapOvr>
+</p:sld>
+</file>
+
+<file path=ppt/slides/slide11.xml><?xml version="1.0" encoding="utf-8"?>
+<p:sld xmlns:a="http://schemas.openxmlformats.org/drawingml/2006/main" xmlns:r="http://schemas.openxmlformats.org/officeDocument/2006/relationships" xmlns:p="http://schemas.openxmlformats.org/presentationml/2006/main">
+  <p:cSld>
+    <p:spTree>
+      <p:nvGrpSpPr>
+        <p:cNvPr id="1" name=""/>
+        <p:cNvGrpSpPr/>
+        <p:nvPr/>
+      </p:nvGrpSpPr>
+      <p:grpSpPr>
+        <a:xfrm>
+          <a:off x="0" y="0"/>
+          <a:ext cx="0" cy="0"/>
+          <a:chOff x="0" y="0"/>
+          <a:chExt cx="0" cy="0"/>
+        </a:xfrm>
+      </p:grpSpPr>
+      <p:sp>
+        <p:nvSpPr>
+          <p:cNvPr id="2" name="Title 1">
+            <a:extLst>
+              <a:ext uri="{FF2B5EF4-FFF2-40B4-BE49-F238E27FC236}">
+                <a16:creationId xmlns:a16="http://schemas.microsoft.com/office/drawing/2014/main" id="{DA2F1D11-698C-AF94-FDA9-067560C3ECBF}"/>
+              </a:ext>
+            </a:extLst>
+          </p:cNvPr>
+          <p:cNvSpPr>
+            <a:spLocks noGrp="1"/>
+          </p:cNvSpPr>
+          <p:nvPr>
+            <p:ph type="title"/>
+          </p:nvPr>
+        </p:nvSpPr>
+        <p:spPr/>
+        <p:txBody>
+          <a:bodyPr/>
+          <a:lstStyle/>
+          <a:p>
+            <a:r>
+              <a:rPr lang="en-US" dirty="0"/>
+              <a:t>Leave Balance Report</a:t>
+            </a:r>
+            <a:endParaRPr lang="en-IN" dirty="0"/>
+          </a:p>
+        </p:txBody>
+      </p:sp>
+      <p:pic>
+        <p:nvPicPr>
+          <p:cNvPr id="5" name="Content Placeholder 4">
+            <a:extLst>
+              <a:ext uri="{FF2B5EF4-FFF2-40B4-BE49-F238E27FC236}">
+                <a16:creationId xmlns:a16="http://schemas.microsoft.com/office/drawing/2014/main" id="{DA491058-18FF-E957-9017-53A57C0EC6C8}"/>
+              </a:ext>
+            </a:extLst>
+          </p:cNvPr>
+          <p:cNvPicPr>
+            <a:picLocks noGrp="1" noChangeAspect="1"/>
+          </p:cNvPicPr>
+          <p:nvPr>
+            <p:ph idx="1"/>
+          </p:nvPr>
+        </p:nvPicPr>
+        <p:blipFill>
+          <a:blip r:embed="rId2">
+            <a:extLst>
+              <a:ext uri="{28A0092B-C50C-407E-A947-70E740481C1C}">
+                <a14:useLocalDpi xmlns:a14="http://schemas.microsoft.com/office/drawing/2010/main" val="0"/>
+              </a:ext>
+            </a:extLst>
+          </a:blip>
+          <a:stretch>
+            <a:fillRect/>
+          </a:stretch>
+        </p:blipFill>
+        <p:spPr>
+          <a:xfrm>
+            <a:off x="2457450" y="1204767"/>
+            <a:ext cx="6247260" cy="5577033"/>
+          </a:xfrm>
+        </p:spPr>
+      </p:pic>
+    </p:spTree>
+    <p:extLst>
+      <p:ext uri="{BB962C8B-B14F-4D97-AF65-F5344CB8AC3E}">
+        <p14:creationId xmlns:p14="http://schemas.microsoft.com/office/powerpoint/2010/main" val="2335250832"/>
+      </p:ext>
+    </p:extLst>
+  </p:cSld>
+  <p:clrMapOvr>
+    <a:masterClrMapping/>
+  </p:clrMapOvr>
+</p:sld>
+</file>
+
+<file path=ppt/slides/slide12.xml><?xml version="1.0" encoding="utf-8"?>
+<p:sld xmlns:a="http://schemas.openxmlformats.org/drawingml/2006/main" xmlns:r="http://schemas.openxmlformats.org/officeDocument/2006/relationships" xmlns:p="http://schemas.openxmlformats.org/presentationml/2006/main">
+  <p:cSld>
+    <p:spTree>
+      <p:nvGrpSpPr>
+        <p:cNvPr id="1" name=""/>
+        <p:cNvGrpSpPr/>
+        <p:nvPr/>
+      </p:nvGrpSpPr>
+      <p:grpSpPr>
+        <a:xfrm>
+          <a:off x="0" y="0"/>
+          <a:ext cx="0" cy="0"/>
+          <a:chOff x="0" y="0"/>
+          <a:chExt cx="0" cy="0"/>
+        </a:xfrm>
+      </p:grpSpPr>
+      <p:sp>
+        <p:nvSpPr>
+          <p:cNvPr id="2" name="Title 1">
+            <a:extLst>
+              <a:ext uri="{FF2B5EF4-FFF2-40B4-BE49-F238E27FC236}">
+                <a16:creationId xmlns:a16="http://schemas.microsoft.com/office/drawing/2014/main" id="{6B5F205D-9B0D-D063-554A-59BA1F136252}"/>
+              </a:ext>
+            </a:extLst>
+          </p:cNvPr>
+          <p:cNvSpPr>
+            <a:spLocks noGrp="1"/>
+          </p:cNvSpPr>
+          <p:nvPr>
+            <p:ph type="title"/>
+          </p:nvPr>
+        </p:nvSpPr>
+        <p:spPr>
+          <a:xfrm>
+            <a:off x="733425" y="452718"/>
+            <a:ext cx="9317409" cy="1118907"/>
+          </a:xfrm>
+        </p:spPr>
+        <p:txBody>
+          <a:bodyPr/>
+          <a:lstStyle/>
+          <a:p>
+            <a:r>
+              <a:rPr lang="en-IN" dirty="0"/>
+              <a:t>Conclusion</a:t>
+            </a:r>
+          </a:p>
+        </p:txBody>
+      </p:sp>
+      <p:sp>
+        <p:nvSpPr>
+          <p:cNvPr id="3" name="Content Placeholder 2">
+            <a:extLst>
+              <a:ext uri="{FF2B5EF4-FFF2-40B4-BE49-F238E27FC236}">
+                <a16:creationId xmlns:a16="http://schemas.microsoft.com/office/drawing/2014/main" id="{F4F651FC-1C10-C51F-3333-E03ACE4373D0}"/>
+              </a:ext>
+            </a:extLst>
+          </p:cNvPr>
+          <p:cNvSpPr>
+            <a:spLocks noGrp="1"/>
+          </p:cNvSpPr>
+          <p:nvPr>
+            <p:ph idx="1"/>
+          </p:nvPr>
+        </p:nvSpPr>
+        <p:spPr>
+          <a:xfrm>
+            <a:off x="1047750" y="1933576"/>
+            <a:ext cx="9002103" cy="4314824"/>
+          </a:xfrm>
+        </p:spPr>
+        <p:txBody>
+          <a:bodyPr>
+            <a:normAutofit/>
+          </a:bodyPr>
+          <a:lstStyle/>
+          <a:p>
+            <a:r>
+              <a:rPr lang="en-US" sz="2400" dirty="0"/>
+              <a:t>In conclusion, the Office Leave Management System is a powerful tool that can help organizations of all sizes to streamline their leave management process and improve overall efficiency.</a:t>
+            </a:r>
+            <a:endParaRPr lang="en-IN" sz="2400" dirty="0"/>
+          </a:p>
+        </p:txBody>
+      </p:sp>
+    </p:spTree>
+    <p:extLst>
+      <p:ext uri="{BB962C8B-B14F-4D97-AF65-F5344CB8AC3E}">
+        <p14:creationId xmlns:p14="http://schemas.microsoft.com/office/powerpoint/2010/main" val="601801345"/>
+      </p:ext>
+    </p:extLst>
+  </p:cSld>
+  <p:clrMapOvr>
+    <a:masterClrMapping/>
+  </p:clrMapOvr>
+</p:sld>
+</file>
+
 <file path=ppt/slides/slide2.xml><?xml version="1.0" encoding="utf-8"?>
 <p:sld xmlns:a="http://schemas.openxmlformats.org/drawingml/2006/main" xmlns:r="http://schemas.openxmlformats.org/officeDocument/2006/relationships" xmlns:p="http://schemas.openxmlformats.org/presentationml/2006/main">
   <p:cSld>
@@ -6354,15 +6650,7 @@
           <a:p>
             <a:r>
               <a:rPr lang="en-US" sz="2400" dirty="0"/>
-              <a:t>The </a:t>
-            </a:r>
-            <a:r>
-              <a:rPr lang="en-US" sz="2400" dirty="0" err="1"/>
-              <a:t>Offlice</a:t>
-            </a:r>
-            <a:r>
-              <a:rPr lang="en-US" sz="2400" dirty="0"/>
-              <a:t> Leave Management System offers a range of features that make it easy for both employees and managers to manage leave requests. These features include automated leave balance calculations, customizable leave policies, and real-time status updates on leave requests.</a:t>
+              <a:t>The Office Leave Management System offers a range of features that make it easy for both employees and managers to manage leave requests. These features include automated leave balance calculations, customizable leave policies, and real-time status updates on leave requests.</a:t>
             </a:r>
             <a:endParaRPr lang="en-IN" sz="2400" dirty="0"/>
           </a:p>
@@ -6843,7 +7131,7 @@
           <p:cNvPr id="2" name="Title 1">
             <a:extLst>
               <a:ext uri="{FF2B5EF4-FFF2-40B4-BE49-F238E27FC236}">
-                <a16:creationId xmlns:a16="http://schemas.microsoft.com/office/drawing/2014/main" id="{6B5F205D-9B0D-D063-554A-59BA1F136252}"/>
+                <a16:creationId xmlns:a16="http://schemas.microsoft.com/office/drawing/2014/main" id="{6A9A108C-27CA-BF37-D7B2-F3C1FE92364F}"/>
               </a:ext>
             </a:extLst>
           </p:cNvPr>
@@ -6854,63 +7142,152 @@
             <p:ph type="title"/>
           </p:nvPr>
         </p:nvSpPr>
-        <p:spPr>
-          <a:xfrm>
-            <a:off x="733425" y="452718"/>
-            <a:ext cx="9317409" cy="1118907"/>
-          </a:xfrm>
-        </p:spPr>
-        <p:txBody>
-          <a:bodyPr/>
-          <a:lstStyle/>
-          <a:p>
-            <a:r>
-              <a:rPr lang="en-IN" dirty="0"/>
-              <a:t>Conclusion</a:t>
-            </a:r>
-          </a:p>
-        </p:txBody>
-      </p:sp>
-      <p:sp>
-        <p:nvSpPr>
-          <p:cNvPr id="3" name="Content Placeholder 2">
+        <p:spPr/>
+        <p:txBody>
+          <a:bodyPr/>
+          <a:lstStyle/>
+          <a:p>
+            <a:r>
+              <a:rPr lang="en-US" dirty="0"/>
+              <a:t>Apply for leave</a:t>
+            </a:r>
+            <a:endParaRPr lang="en-IN" dirty="0"/>
+          </a:p>
+        </p:txBody>
+      </p:sp>
+      <p:pic>
+        <p:nvPicPr>
+          <p:cNvPr id="5" name="Content Placeholder 4">
             <a:extLst>
               <a:ext uri="{FF2B5EF4-FFF2-40B4-BE49-F238E27FC236}">
-                <a16:creationId xmlns:a16="http://schemas.microsoft.com/office/drawing/2014/main" id="{F4F651FC-1C10-C51F-3333-E03ACE4373D0}"/>
+                <a16:creationId xmlns:a16="http://schemas.microsoft.com/office/drawing/2014/main" id="{0F9A8647-A054-93C3-BAA6-822E82299B92}"/>
               </a:ext>
             </a:extLst>
           </p:cNvPr>
-          <p:cNvSpPr>
-            <a:spLocks noGrp="1"/>
-          </p:cNvSpPr>
+          <p:cNvPicPr>
+            <a:picLocks noGrp="1" noChangeAspect="1"/>
+          </p:cNvPicPr>
           <p:nvPr>
             <p:ph idx="1"/>
           </p:nvPr>
-        </p:nvSpPr>
+        </p:nvPicPr>
+        <p:blipFill>
+          <a:blip r:embed="rId2">
+            <a:extLst>
+              <a:ext uri="{28A0092B-C50C-407E-A947-70E740481C1C}">
+                <a14:useLocalDpi xmlns:a14="http://schemas.microsoft.com/office/drawing/2010/main" val="0"/>
+              </a:ext>
+            </a:extLst>
+          </a:blip>
+          <a:stretch>
+            <a:fillRect/>
+          </a:stretch>
+        </p:blipFill>
         <p:spPr>
           <a:xfrm>
-            <a:off x="1047750" y="1933576"/>
-            <a:ext cx="9002103" cy="4314824"/>
+            <a:off x="419100" y="1371599"/>
+            <a:ext cx="11410949" cy="5191125"/>
           </a:xfrm>
         </p:spPr>
-        <p:txBody>
-          <a:bodyPr>
-            <a:normAutofit/>
-          </a:bodyPr>
-          <a:lstStyle/>
-          <a:p>
-            <a:r>
-              <a:rPr lang="en-US" sz="2400" dirty="0"/>
-              <a:t>In conclusion, the Office Leave Management System is a powerful tool that can help organizations of all sizes to streamline their leave management process and improve overall efficiency.</a:t>
-            </a:r>
-            <a:endParaRPr lang="en-IN" sz="2400" dirty="0"/>
-          </a:p>
-        </p:txBody>
-      </p:sp>
+      </p:pic>
     </p:spTree>
     <p:extLst>
       <p:ext uri="{BB962C8B-B14F-4D97-AF65-F5344CB8AC3E}">
-        <p14:creationId xmlns:p14="http://schemas.microsoft.com/office/powerpoint/2010/main" val="601801345"/>
+        <p14:creationId xmlns:p14="http://schemas.microsoft.com/office/powerpoint/2010/main" val="1371630020"/>
+      </p:ext>
+    </p:extLst>
+  </p:cSld>
+  <p:clrMapOvr>
+    <a:masterClrMapping/>
+  </p:clrMapOvr>
+</p:sld>
+</file>
+
+<file path=ppt/slides/slide9.xml><?xml version="1.0" encoding="utf-8"?>
+<p:sld xmlns:a="http://schemas.openxmlformats.org/drawingml/2006/main" xmlns:r="http://schemas.openxmlformats.org/officeDocument/2006/relationships" xmlns:p="http://schemas.openxmlformats.org/presentationml/2006/main">
+  <p:cSld>
+    <p:spTree>
+      <p:nvGrpSpPr>
+        <p:cNvPr id="1" name=""/>
+        <p:cNvGrpSpPr/>
+        <p:nvPr/>
+      </p:nvGrpSpPr>
+      <p:grpSpPr>
+        <a:xfrm>
+          <a:off x="0" y="0"/>
+          <a:ext cx="0" cy="0"/>
+          <a:chOff x="0" y="0"/>
+          <a:chExt cx="0" cy="0"/>
+        </a:xfrm>
+      </p:grpSpPr>
+      <p:sp>
+        <p:nvSpPr>
+          <p:cNvPr id="2" name="Title 1">
+            <a:extLst>
+              <a:ext uri="{FF2B5EF4-FFF2-40B4-BE49-F238E27FC236}">
+                <a16:creationId xmlns:a16="http://schemas.microsoft.com/office/drawing/2014/main" id="{F9B618FA-5DDF-1B3E-683C-00958C818222}"/>
+              </a:ext>
+            </a:extLst>
+          </p:cNvPr>
+          <p:cNvSpPr>
+            <a:spLocks noGrp="1"/>
+          </p:cNvSpPr>
+          <p:nvPr>
+            <p:ph type="title"/>
+          </p:nvPr>
+        </p:nvSpPr>
+        <p:spPr/>
+        <p:txBody>
+          <a:bodyPr/>
+          <a:lstStyle/>
+          <a:p>
+            <a:r>
+              <a:rPr lang="en-US" dirty="0"/>
+              <a:t>Approve or Reject the Leave</a:t>
+            </a:r>
+            <a:endParaRPr lang="en-IN" dirty="0"/>
+          </a:p>
+        </p:txBody>
+      </p:sp>
+      <p:pic>
+        <p:nvPicPr>
+          <p:cNvPr id="7" name="Content Placeholder 6">
+            <a:extLst>
+              <a:ext uri="{FF2B5EF4-FFF2-40B4-BE49-F238E27FC236}">
+                <a16:creationId xmlns:a16="http://schemas.microsoft.com/office/drawing/2014/main" id="{A58D901A-4F28-C5F0-078C-6F3F37913E23}"/>
+              </a:ext>
+            </a:extLst>
+          </p:cNvPr>
+          <p:cNvPicPr>
+            <a:picLocks noGrp="1" noChangeAspect="1"/>
+          </p:cNvPicPr>
+          <p:nvPr>
+            <p:ph idx="1"/>
+          </p:nvPr>
+        </p:nvPicPr>
+        <p:blipFill>
+          <a:blip r:embed="rId2">
+            <a:extLst>
+              <a:ext uri="{28A0092B-C50C-407E-A947-70E740481C1C}">
+                <a14:useLocalDpi xmlns:a14="http://schemas.microsoft.com/office/drawing/2010/main" val="0"/>
+              </a:ext>
+            </a:extLst>
+          </a:blip>
+          <a:stretch>
+            <a:fillRect/>
+          </a:stretch>
+        </p:blipFill>
+        <p:spPr>
+          <a:xfrm>
+            <a:off x="312738" y="1604010"/>
+            <a:ext cx="11341874" cy="4801272"/>
+          </a:xfrm>
+        </p:spPr>
+      </p:pic>
+    </p:spTree>
+    <p:extLst>
+      <p:ext uri="{BB962C8B-B14F-4D97-AF65-F5344CB8AC3E}">
+        <p14:creationId xmlns:p14="http://schemas.microsoft.com/office/powerpoint/2010/main" val="3936931209"/>
       </p:ext>
     </p:extLst>
   </p:cSld>

</xml_diff>